<commit_message>
Polished up documentation files to reflect the unit tests.
</commit_message>
<xml_diff>
--- a/src/demo_test_results/PresentationWBullets_created.pptx
+++ b/src/demo_test_results/PresentationWBullets_created.pptx
@@ -3118,7 +3118,7 @@
             </a:r>
           </a:p>
           <a:p>
-            <a:pPr marL="114300" indent="-114300" algn="l">
+            <a:pPr marL="114300" indent="-114300">
               <a:spcBef>
                 <a:spcPts val="600"/>
               </a:spcBef>
@@ -3130,7 +3130,7 @@
             </a:r>
           </a:p>
           <a:p>
-            <a:pPr marL="114300" indent="-114300" algn="l">
+            <a:pPr marL="114300" indent="-114300">
               <a:spcBef>
                 <a:spcPts val="600"/>
               </a:spcBef>
@@ -3142,7 +3142,7 @@
             </a:r>
           </a:p>
           <a:p>
-            <a:pPr marL="228600" indent="-114300" algn="l" lvl="1">
+            <a:pPr marL="228600" indent="-114300" lvl="1">
               <a:spcBef>
                 <a:spcPts val="600"/>
               </a:spcBef>
@@ -3154,7 +3154,7 @@
             </a:r>
           </a:p>
           <a:p>
-            <a:pPr marL="342900" indent="-114300" algn="l" lvl="2">
+            <a:pPr marL="342900" indent="-114300" lvl="2">
               <a:spcBef>
                 <a:spcPts val="600"/>
               </a:spcBef>
@@ -3166,7 +3166,7 @@
             </a:r>
           </a:p>
           <a:p>
-            <a:pPr marL="228600" indent="-114300" algn="l" lvl="1">
+            <a:pPr marL="228600" indent="-114300" lvl="1">
               <a:spcBef>
                 <a:spcPts val="600"/>
               </a:spcBef>
@@ -3178,7 +3178,7 @@
             </a:r>
           </a:p>
           <a:p>
-            <a:pPr marL="114300" indent="-114300" algn="l">
+            <a:pPr marL="114300" indent="-114300">
               <a:spcBef>
                 <a:spcPts val="600"/>
               </a:spcBef>
@@ -3190,7 +3190,7 @@
             </a:r>
           </a:p>
           <a:p>
-            <a:pPr marL="114300" indent="-114300" algn="l">
+            <a:pPr marL="114300" indent="-114300">
               <a:spcBef>
                 <a:spcPts val="600"/>
               </a:spcBef>
@@ -3202,7 +3202,7 @@
             </a:r>
           </a:p>
           <a:p>
-            <a:pPr marL="228600" indent="-114300" algn="l" lvl="1">
+            <a:pPr marL="228600" indent="-114300" lvl="1">
               <a:spcBef>
                 <a:spcPts val="600"/>
               </a:spcBef>
@@ -3214,7 +3214,7 @@
             </a:r>
           </a:p>
           <a:p>
-            <a:pPr marL="342900" indent="-114300" algn="l" lvl="2">
+            <a:pPr marL="342900" indent="-114300" lvl="2">
               <a:spcBef>
                 <a:spcPts val="600"/>
               </a:spcBef>

</xml_diff>